<commit_message>
Final touches to ppt
</commit_message>
<xml_diff>
--- a/PPT/Intern Projects.pptx
+++ b/PPT/Intern Projects.pptx
@@ -8315,15 +8315,7 @@
           <a:p>
             <a:r>
               <a:rPr lang="en-US" dirty="0" smtClean="0"/>
-              <a:t>Heat maps/graphs on product </a:t>
-            </a:r>
-            <a:r>
-              <a:rPr lang="en-US" dirty="0" smtClean="0"/>
-              <a:t>-acceptance </a:t>
-            </a:r>
-            <a:r>
-              <a:rPr lang="en-US" dirty="0" smtClean="0"/>
-              <a:t>and quality of service gives definitive idea on  areas of improvement.</a:t>
+              <a:t>Heat maps/graphs on product -acceptance and quality of service gives definitive idea on  areas of improvement.</a:t>
             </a:r>
           </a:p>
           <a:p>
@@ -10561,23 +10553,17 @@
           <a:bodyPr rtlCol="0" anchor="ctr"/>
           <a:lstStyle/>
           <a:p>
-            <a:pPr marL="285750" lvl="0" indent="-285750">
-              <a:buFont typeface="Arial" panose="020B0604020202020204" pitchFamily="34" charset="0"/>
-              <a:buChar char="•"/>
-            </a:pPr>
-            <a:r>
-              <a:rPr lang="en-US" b="1" dirty="0"/>
-              <a:t>Reducing number of order processors as this could become the page  to process order</a:t>
-            </a:r>
-          </a:p>
-          <a:p>
             <a:pPr marL="285750" indent="-285750">
               <a:buFont typeface="Arial" panose="020B0604020202020204" pitchFamily="34" charset="0"/>
               <a:buChar char="•"/>
             </a:pPr>
             <a:r>
+              <a:rPr lang="en-US" b="1" dirty="0" smtClean="0"/>
+              <a:t>Was </a:t>
+            </a:r>
+            <a:r>
               <a:rPr lang="en-US" b="1" dirty="0"/>
-              <a:t>Was built almost 10 years ago, with .</a:t>
+              <a:t>built almost 10 years ago, with .</a:t>
             </a:r>
             <a:r>
               <a:rPr lang="en-US" b="1" dirty="0" smtClean="0"/>
@@ -10715,53 +10701,66 @@
           <a:bodyPr rtlCol="0" anchor="ctr"/>
           <a:lstStyle/>
           <a:p>
+            <a:pPr marL="285750" indent="-285750">
+              <a:buFont typeface="Arial" panose="020B0604020202020204" pitchFamily="34" charset="0"/>
+              <a:buChar char="•"/>
+            </a:pPr>
+            <a:r>
+              <a:rPr lang="en-US" b="1" dirty="0"/>
+              <a:t>Reducing number of order processors as this could become the page  to process </a:t>
+            </a:r>
+            <a:r>
+              <a:rPr lang="en-US" b="1" dirty="0" smtClean="0"/>
+              <a:t>order </a:t>
+            </a:r>
+            <a:r>
+              <a:rPr lang="en-US" b="1" dirty="0"/>
+              <a:t>(</a:t>
+            </a:r>
+            <a:r>
+              <a:rPr lang="en-US" b="1" dirty="0" smtClean="0"/>
+              <a:t>making it editable using  </a:t>
+            </a:r>
+            <a:r>
+              <a:rPr lang="en-US" b="1" dirty="0"/>
+              <a:t>two way binding of </a:t>
+            </a:r>
+            <a:r>
+              <a:rPr lang="en-US" b="1" dirty="0" err="1"/>
+              <a:t>AngularJS</a:t>
+            </a:r>
+            <a:r>
+              <a:rPr lang="en-US" b="1" dirty="0" smtClean="0"/>
+              <a:t>). </a:t>
+            </a:r>
+            <a:r>
+              <a:rPr lang="en-US" b="1" smtClean="0"/>
+              <a:t>Eliminates </a:t>
+            </a:r>
+            <a:r>
+              <a:rPr lang="en-US" b="1" dirty="0" smtClean="0"/>
+              <a:t>another data entry system.</a:t>
+            </a:r>
+            <a:endParaRPr lang="en-US" b="1" dirty="0" smtClean="0"/>
+          </a:p>
+          <a:p>
             <a:pPr marL="285750" lvl="0" indent="-285750">
               <a:buFont typeface="Arial" panose="020B0604020202020204" pitchFamily="34" charset="0"/>
               <a:buChar char="•"/>
             </a:pPr>
             <a:r>
               <a:rPr lang="en-US" b="1" dirty="0" smtClean="0"/>
-              <a:t>Extend the project to EMEA and APJ regions</a:t>
-            </a:r>
-          </a:p>
-          <a:p>
-            <a:pPr marL="285750" lvl="0" indent="-285750">
-              <a:buFont typeface="Arial" panose="020B0604020202020204" pitchFamily="34" charset="0"/>
-              <a:buChar char="•"/>
-            </a:pPr>
+              <a:t>Extend </a:t>
+            </a:r>
             <a:r>
               <a:rPr lang="en-US" b="1" dirty="0" smtClean="0"/>
-              <a:t>Make </a:t>
-            </a:r>
-            <a:r>
-              <a:rPr lang="en-US" b="1" dirty="0"/>
-              <a:t>it editable so that, the orders can be changed and submitted from this page itself, which will eliminate another data entry system. </a:t>
+              <a:t>the project to EMEA and APJ </a:t>
             </a:r>
             <a:r>
               <a:rPr lang="en-US" b="1" dirty="0" smtClean="0"/>
-              <a:t>(Using </a:t>
-            </a:r>
-            <a:r>
-              <a:rPr lang="en-US" b="1" dirty="0" smtClean="0"/>
-              <a:t> </a:t>
-            </a:r>
-            <a:r>
-              <a:rPr lang="en-US" b="1" dirty="0" smtClean="0"/>
-              <a:t>two way </a:t>
-            </a:r>
-            <a:r>
-              <a:rPr lang="en-US" b="1" dirty="0" smtClean="0"/>
-              <a:t>binding of </a:t>
-            </a:r>
-            <a:r>
-              <a:rPr lang="en-US" b="1" dirty="0" err="1" smtClean="0"/>
-              <a:t>AngularJS</a:t>
-            </a:r>
-            <a:r>
-              <a:rPr lang="en-US" b="1" dirty="0" smtClean="0"/>
-              <a:t>).</a:t>
-            </a:r>
-            <a:endParaRPr lang="en-US" b="1" dirty="0"/>
+              <a:t>regions</a:t>
+            </a:r>
+            <a:endParaRPr lang="en-US" b="1" dirty="0" smtClean="0"/>
           </a:p>
         </p:txBody>
       </p:sp>

</xml_diff>